<commit_message>
added few more details
</commit_message>
<xml_diff>
--- a/Lending_Club_Case_Study.pptx
+++ b/Lending_Club_Case_Study.pptx
@@ -12,6 +12,9 @@
     <p:sldId id="261" r:id="rId6"/>
     <p:sldId id="262" r:id="rId7"/>
     <p:sldId id="263" r:id="rId8"/>
+    <p:sldId id="265" r:id="rId9"/>
+    <p:sldId id="266" r:id="rId10"/>
+    <p:sldId id="267" r:id="rId11"/>
   </p:sldIdLst>
   <p:sldSz cx="12192000" cy="6858000"/>
   <p:notesSz cx="6858000" cy="9144000"/>
@@ -3446,6 +3449,70 @@
 </p:sld>
 </file>
 
+<file path=ppt/slides/slide10.xml><?xml version="1.0" encoding="utf-8"?>
+<p:sld xmlns:a="http://schemas.openxmlformats.org/drawingml/2006/main" xmlns:r="http://schemas.openxmlformats.org/officeDocument/2006/relationships" xmlns:p="http://schemas.openxmlformats.org/presentationml/2006/main">
+  <p:cSld>
+    <p:spTree>
+      <p:nvGrpSpPr>
+        <p:cNvPr id="1" name=""/>
+        <p:cNvGrpSpPr/>
+        <p:nvPr/>
+      </p:nvGrpSpPr>
+      <p:grpSpPr>
+        <a:xfrm>
+          <a:off x="0" y="0"/>
+          <a:ext cx="0" cy="0"/>
+          <a:chOff x="0" y="0"/>
+          <a:chExt cx="0" cy="0"/>
+        </a:xfrm>
+      </p:grpSpPr>
+      <p:sp>
+        <p:nvSpPr>
+          <p:cNvPr id="2" name="Title 1">
+            <a:extLst>
+              <a:ext uri="{FF2B5EF4-FFF2-40B4-BE49-F238E27FC236}">
+                <a16:creationId xmlns:a16="http://schemas.microsoft.com/office/drawing/2014/main" id="{E5531FB3-215E-340E-5482-0E114DEEBAE0}"/>
+              </a:ext>
+            </a:extLst>
+          </p:cNvPr>
+          <p:cNvSpPr>
+            <a:spLocks noGrp="1"/>
+          </p:cNvSpPr>
+          <p:nvPr>
+            <p:ph type="title"/>
+          </p:nvPr>
+        </p:nvSpPr>
+        <p:spPr>
+          <a:xfrm>
+            <a:off x="4367981" y="2892015"/>
+            <a:ext cx="2986548" cy="1325563"/>
+          </a:xfrm>
+        </p:spPr>
+        <p:txBody>
+          <a:bodyPr/>
+          <a:lstStyle/>
+          <a:p>
+            <a:r>
+              <a:rPr lang="en-US" dirty="0"/>
+              <a:t>Thank you</a:t>
+            </a:r>
+            <a:endParaRPr lang="en-IN" dirty="0"/>
+          </a:p>
+        </p:txBody>
+      </p:sp>
+    </p:spTree>
+    <p:extLst>
+      <p:ext uri="{BB962C8B-B14F-4D97-AF65-F5344CB8AC3E}">
+        <p14:creationId xmlns:p14="http://schemas.microsoft.com/office/powerpoint/2010/main" val="2484875609"/>
+      </p:ext>
+    </p:extLst>
+  </p:cSld>
+  <p:clrMapOvr>
+    <a:masterClrMapping/>
+  </p:clrMapOvr>
+</p:sld>
+</file>
+
 <file path=ppt/slides/slide2.xml><?xml version="1.0" encoding="utf-8"?>
 <p:sld xmlns:a="http://schemas.openxmlformats.org/drawingml/2006/main" xmlns:r="http://schemas.openxmlformats.org/officeDocument/2006/relationships" xmlns:p="http://schemas.openxmlformats.org/presentationml/2006/main">
   <p:cSld>
@@ -4197,11 +4264,75 @@
         </p:spPr>
         <p:txBody>
           <a:bodyPr>
-            <a:normAutofit/>
+            <a:normAutofit lnSpcReduction="10000"/>
           </a:bodyPr>
           <a:lstStyle/>
           <a:p>
+            <a:r>
+              <a:rPr lang="en-US" dirty="0"/>
+              <a:t>We are doing both univariate and bivariate analysis</a:t>
+            </a:r>
+          </a:p>
+          <a:p>
+            <a:endParaRPr lang="en-US" dirty="0"/>
+          </a:p>
+          <a:p>
+            <a:r>
+              <a:rPr lang="en-US" dirty="0"/>
+              <a:t>Univariate Analysis</a:t>
+            </a:r>
+          </a:p>
+          <a:p>
+            <a:pPr lvl="1"/>
+            <a:r>
+              <a:rPr lang="en-US" dirty="0"/>
+              <a:t>In this, we are analyzing relevant individual columns with </a:t>
+            </a:r>
+            <a:r>
+              <a:rPr lang="en-US" dirty="0" err="1"/>
+              <a:t>loan_status</a:t>
+            </a:r>
+            <a:r>
+              <a:rPr lang="en-US" dirty="0"/>
+              <a:t>, which gives us a valuable insights on the attributes to loan defaults</a:t>
+            </a:r>
+          </a:p>
+          <a:p>
+            <a:pPr lvl="1"/>
+            <a:endParaRPr lang="en-US" dirty="0"/>
+          </a:p>
+          <a:p>
+            <a:r>
+              <a:rPr lang="en-US" dirty="0"/>
+              <a:t>Bivariate Analysis</a:t>
+            </a:r>
+          </a:p>
+          <a:p>
+            <a:pPr lvl="1"/>
+            <a:r>
+              <a:rPr lang="en-US" dirty="0"/>
+              <a:t>In this, we are analyzing two columns and how that behaves when analyzed with loan defaults</a:t>
+            </a:r>
             <a:endParaRPr lang="en-IN" dirty="0"/>
+          </a:p>
+          <a:p>
+            <a:pPr lvl="1"/>
+            <a:endParaRPr lang="en-IN" dirty="0"/>
+          </a:p>
+          <a:p>
+            <a:r>
+              <a:rPr lang="en-IN" dirty="0"/>
+              <a:t>The visualizations of both these analysis are available in the </a:t>
+            </a:r>
+            <a:r>
+              <a:rPr lang="en-IN" dirty="0" err="1"/>
+              <a:t>ipynb</a:t>
+            </a:r>
+            <a:r>
+              <a:rPr lang="en-IN" dirty="0"/>
+              <a:t> file.</a:t>
+            </a:r>
+            <a:endParaRPr lang="en-US" dirty="0"/>
           </a:p>
         </p:txBody>
       </p:sp>
@@ -4209,6 +4340,454 @@
     <p:extLst>
       <p:ext uri="{BB962C8B-B14F-4D97-AF65-F5344CB8AC3E}">
         <p14:creationId xmlns:p14="http://schemas.microsoft.com/office/powerpoint/2010/main" val="691394217"/>
+      </p:ext>
+    </p:extLst>
+  </p:cSld>
+  <p:clrMapOvr>
+    <a:masterClrMapping/>
+  </p:clrMapOvr>
+</p:sld>
+</file>
+
+<file path=ppt/slides/slide8.xml><?xml version="1.0" encoding="utf-8"?>
+<p:sld xmlns:a="http://schemas.openxmlformats.org/drawingml/2006/main" xmlns:r="http://schemas.openxmlformats.org/officeDocument/2006/relationships" xmlns:p="http://schemas.openxmlformats.org/presentationml/2006/main">
+  <p:cSld>
+    <p:spTree>
+      <p:nvGrpSpPr>
+        <p:cNvPr id="1" name=""/>
+        <p:cNvGrpSpPr/>
+        <p:nvPr/>
+      </p:nvGrpSpPr>
+      <p:grpSpPr>
+        <a:xfrm>
+          <a:off x="0" y="0"/>
+          <a:ext cx="0" cy="0"/>
+          <a:chOff x="0" y="0"/>
+          <a:chExt cx="0" cy="0"/>
+        </a:xfrm>
+      </p:grpSpPr>
+      <p:sp>
+        <p:nvSpPr>
+          <p:cNvPr id="2" name="Title 1">
+            <a:extLst>
+              <a:ext uri="{FF2B5EF4-FFF2-40B4-BE49-F238E27FC236}">
+                <a16:creationId xmlns:a16="http://schemas.microsoft.com/office/drawing/2014/main" id="{192F2C72-E3D2-B515-E3EA-8C98304A3A47}"/>
+              </a:ext>
+            </a:extLst>
+          </p:cNvPr>
+          <p:cNvSpPr>
+            <a:spLocks noGrp="1"/>
+          </p:cNvSpPr>
+          <p:nvPr>
+            <p:ph type="title"/>
+          </p:nvPr>
+        </p:nvSpPr>
+        <p:spPr/>
+        <p:txBody>
+          <a:bodyPr/>
+          <a:lstStyle/>
+          <a:p>
+            <a:r>
+              <a:rPr lang="en-US" dirty="0"/>
+              <a:t>Univariate Analysis - Recommendations</a:t>
+            </a:r>
+            <a:endParaRPr lang="en-IN" dirty="0"/>
+          </a:p>
+        </p:txBody>
+      </p:sp>
+      <p:sp>
+        <p:nvSpPr>
+          <p:cNvPr id="3" name="Content Placeholder 2">
+            <a:extLst>
+              <a:ext uri="{FF2B5EF4-FFF2-40B4-BE49-F238E27FC236}">
+                <a16:creationId xmlns:a16="http://schemas.microsoft.com/office/drawing/2014/main" id="{F72F1C5E-B230-6842-C3B2-4A16643450BA}"/>
+              </a:ext>
+            </a:extLst>
+          </p:cNvPr>
+          <p:cNvSpPr>
+            <a:spLocks noGrp="1"/>
+          </p:cNvSpPr>
+          <p:nvPr>
+            <p:ph idx="1"/>
+          </p:nvPr>
+        </p:nvSpPr>
+        <p:spPr>
+          <a:xfrm>
+            <a:off x="838200" y="1800583"/>
+            <a:ext cx="10515600" cy="4692292"/>
+          </a:xfrm>
+        </p:spPr>
+        <p:txBody>
+          <a:bodyPr>
+            <a:normAutofit fontScale="92500" lnSpcReduction="20000"/>
+          </a:bodyPr>
+          <a:lstStyle/>
+          <a:p>
+            <a:pPr algn="l"/>
+            <a:r>
+              <a:rPr lang="en-IN" b="0" i="0" dirty="0">
+                <a:effectLst/>
+                <a:latin typeface="-apple-system"/>
+              </a:rPr>
+              <a:t>Below is the recommendation from the univariate analysis carried out.</a:t>
+            </a:r>
+          </a:p>
+          <a:p>
+            <a:pPr algn="l"/>
+            <a:endParaRPr lang="en-IN" dirty="0">
+              <a:latin typeface="-apple-system"/>
+            </a:endParaRPr>
+          </a:p>
+          <a:p>
+            <a:pPr algn="l"/>
+            <a:r>
+              <a:rPr lang="en-IN" b="0" i="0" dirty="0">
+                <a:effectLst/>
+                <a:latin typeface="-apple-system"/>
+              </a:rPr>
+              <a:t>There is a higher possibility of loan default when</a:t>
+            </a:r>
+          </a:p>
+          <a:p>
+            <a:pPr lvl="1"/>
+            <a:r>
+              <a:rPr lang="en-IN" b="0" i="0" dirty="0">
+                <a:effectLst/>
+                <a:latin typeface="-apple-system"/>
+              </a:rPr>
+              <a:t>the applicants are having a </a:t>
+            </a:r>
+            <a:r>
+              <a:rPr lang="en-IN" b="0" i="0" dirty="0" err="1">
+                <a:effectLst/>
+                <a:latin typeface="-apple-system"/>
+              </a:rPr>
+              <a:t>house_ownership</a:t>
+            </a:r>
+            <a:r>
+              <a:rPr lang="en-IN" b="0" i="0" dirty="0">
+                <a:effectLst/>
+                <a:latin typeface="-apple-system"/>
+              </a:rPr>
+              <a:t> as 'RENT'</a:t>
+            </a:r>
+          </a:p>
+          <a:p>
+            <a:pPr lvl="1"/>
+            <a:r>
+              <a:rPr lang="en-IN" b="0" i="0" dirty="0">
+                <a:effectLst/>
+                <a:latin typeface="-apple-system"/>
+              </a:rPr>
+              <a:t>the loan status is not verified</a:t>
+            </a:r>
+          </a:p>
+          <a:p>
+            <a:pPr lvl="1"/>
+            <a:r>
+              <a:rPr lang="en-IN" b="0" i="0" dirty="0">
+                <a:effectLst/>
+                <a:latin typeface="-apple-system"/>
+              </a:rPr>
+              <a:t>the applicants get loans to clear other debts</a:t>
+            </a:r>
+          </a:p>
+          <a:p>
+            <a:pPr lvl="1"/>
+            <a:r>
+              <a:rPr lang="en-IN" b="0" i="0" dirty="0">
+                <a:effectLst/>
+                <a:latin typeface="-apple-system"/>
+              </a:rPr>
+              <a:t>the loan amount is in the range of 5k-10k</a:t>
+            </a:r>
+          </a:p>
+          <a:p>
+            <a:pPr lvl="1"/>
+            <a:r>
+              <a:rPr lang="en-IN" b="0" i="0" dirty="0">
+                <a:effectLst/>
+                <a:latin typeface="-apple-system"/>
+              </a:rPr>
+              <a:t>the interest rate is in the range of 13-17%</a:t>
+            </a:r>
+          </a:p>
+          <a:p>
+            <a:pPr lvl="1"/>
+            <a:r>
+              <a:rPr lang="en-IN" b="0" i="0" dirty="0">
+                <a:effectLst/>
+                <a:latin typeface="-apple-system"/>
+              </a:rPr>
+              <a:t>the number of enquiries in the last 6 months is 0</a:t>
+            </a:r>
+          </a:p>
+          <a:p>
+            <a:pPr lvl="1"/>
+            <a:r>
+              <a:rPr lang="en-IN" b="0" i="0" dirty="0">
+                <a:effectLst/>
+                <a:latin typeface="-apple-system"/>
+              </a:rPr>
+              <a:t>the employment length is 10+ years</a:t>
+            </a:r>
+          </a:p>
+          <a:p>
+            <a:pPr lvl="1"/>
+            <a:r>
+              <a:rPr lang="en-IN" b="0" i="0" dirty="0">
+                <a:effectLst/>
+                <a:latin typeface="-apple-system"/>
+              </a:rPr>
+              <a:t>the funded amount by investor is 5k-10k</a:t>
+            </a:r>
+          </a:p>
+          <a:p>
+            <a:pPr lvl="1"/>
+            <a:r>
+              <a:rPr lang="en-IN" b="0" i="0" dirty="0">
+                <a:effectLst/>
+                <a:latin typeface="-apple-system"/>
+              </a:rPr>
+              <a:t>the monthly </a:t>
+            </a:r>
+            <a:r>
+              <a:rPr lang="en-IN" b="0" i="0" dirty="0" err="1">
+                <a:effectLst/>
+                <a:latin typeface="-apple-system"/>
+              </a:rPr>
+              <a:t>installment</a:t>
+            </a:r>
+            <a:r>
+              <a:rPr lang="en-IN" b="0" i="0" dirty="0">
+                <a:effectLst/>
+                <a:latin typeface="-apple-system"/>
+              </a:rPr>
+              <a:t> is between 145-274</a:t>
+            </a:r>
+          </a:p>
+          <a:p>
+            <a:pPr lvl="1"/>
+            <a:r>
+              <a:rPr lang="en-IN" b="0" i="0" dirty="0">
+                <a:effectLst/>
+                <a:latin typeface="-apple-system"/>
+              </a:rPr>
+              <a:t>the term is 60 months</a:t>
+            </a:r>
+          </a:p>
+          <a:p>
+            <a:pPr lvl="1"/>
+            <a:r>
+              <a:rPr lang="en-IN" b="0" i="0" dirty="0">
+                <a:effectLst/>
+                <a:latin typeface="-apple-system"/>
+              </a:rPr>
+              <a:t>the </a:t>
+            </a:r>
+            <a:r>
+              <a:rPr lang="en-IN" b="0" i="0" dirty="0" err="1">
+                <a:effectLst/>
+                <a:latin typeface="-apple-system"/>
+              </a:rPr>
+              <a:t>open_acc</a:t>
+            </a:r>
+            <a:r>
+              <a:rPr lang="en-IN" b="0" i="0" dirty="0">
+                <a:effectLst/>
+                <a:latin typeface="-apple-system"/>
+              </a:rPr>
+              <a:t> is 20-37</a:t>
+            </a:r>
+          </a:p>
+          <a:p>
+            <a:endParaRPr lang="en-IN" dirty="0"/>
+          </a:p>
+        </p:txBody>
+      </p:sp>
+    </p:spTree>
+    <p:extLst>
+      <p:ext uri="{BB962C8B-B14F-4D97-AF65-F5344CB8AC3E}">
+        <p14:creationId xmlns:p14="http://schemas.microsoft.com/office/powerpoint/2010/main" val="2343778766"/>
+      </p:ext>
+    </p:extLst>
+  </p:cSld>
+  <p:clrMapOvr>
+    <a:masterClrMapping/>
+  </p:clrMapOvr>
+</p:sld>
+</file>
+
+<file path=ppt/slides/slide9.xml><?xml version="1.0" encoding="utf-8"?>
+<p:sld xmlns:a="http://schemas.openxmlformats.org/drawingml/2006/main" xmlns:r="http://schemas.openxmlformats.org/officeDocument/2006/relationships" xmlns:p="http://schemas.openxmlformats.org/presentationml/2006/main">
+  <p:cSld>
+    <p:spTree>
+      <p:nvGrpSpPr>
+        <p:cNvPr id="1" name=""/>
+        <p:cNvGrpSpPr/>
+        <p:nvPr/>
+      </p:nvGrpSpPr>
+      <p:grpSpPr>
+        <a:xfrm>
+          <a:off x="0" y="0"/>
+          <a:ext cx="0" cy="0"/>
+          <a:chOff x="0" y="0"/>
+          <a:chExt cx="0" cy="0"/>
+        </a:xfrm>
+      </p:grpSpPr>
+      <p:sp>
+        <p:nvSpPr>
+          <p:cNvPr id="2" name="Title 1">
+            <a:extLst>
+              <a:ext uri="{FF2B5EF4-FFF2-40B4-BE49-F238E27FC236}">
+                <a16:creationId xmlns:a16="http://schemas.microsoft.com/office/drawing/2014/main" id="{192F2C72-E3D2-B515-E3EA-8C98304A3A47}"/>
+              </a:ext>
+            </a:extLst>
+          </p:cNvPr>
+          <p:cNvSpPr>
+            <a:spLocks noGrp="1"/>
+          </p:cNvSpPr>
+          <p:nvPr>
+            <p:ph type="title"/>
+          </p:nvPr>
+        </p:nvSpPr>
+        <p:spPr/>
+        <p:txBody>
+          <a:bodyPr/>
+          <a:lstStyle/>
+          <a:p>
+            <a:r>
+              <a:rPr lang="en-US" dirty="0"/>
+              <a:t>Bivariate Analysis - Recommendations</a:t>
+            </a:r>
+            <a:endParaRPr lang="en-IN" dirty="0"/>
+          </a:p>
+        </p:txBody>
+      </p:sp>
+      <p:sp>
+        <p:nvSpPr>
+          <p:cNvPr id="3" name="Content Placeholder 2">
+            <a:extLst>
+              <a:ext uri="{FF2B5EF4-FFF2-40B4-BE49-F238E27FC236}">
+                <a16:creationId xmlns:a16="http://schemas.microsoft.com/office/drawing/2014/main" id="{F72F1C5E-B230-6842-C3B2-4A16643450BA}"/>
+              </a:ext>
+            </a:extLst>
+          </p:cNvPr>
+          <p:cNvSpPr>
+            <a:spLocks noGrp="1"/>
+          </p:cNvSpPr>
+          <p:nvPr>
+            <p:ph idx="1"/>
+          </p:nvPr>
+        </p:nvSpPr>
+        <p:spPr>
+          <a:xfrm>
+            <a:off x="838200" y="1800583"/>
+            <a:ext cx="10515600" cy="4692292"/>
+          </a:xfrm>
+        </p:spPr>
+        <p:txBody>
+          <a:bodyPr>
+            <a:normAutofit lnSpcReduction="10000"/>
+          </a:bodyPr>
+          <a:lstStyle/>
+          <a:p>
+            <a:r>
+              <a:rPr lang="en-IN" b="0" i="0" dirty="0">
+                <a:effectLst/>
+                <a:latin typeface="-apple-system"/>
+              </a:rPr>
+              <a:t>Below is the recommendation from the bivariate analysis carried out.</a:t>
+            </a:r>
+          </a:p>
+          <a:p>
+            <a:pPr marL="0" indent="0" algn="l">
+              <a:buNone/>
+            </a:pPr>
+            <a:endParaRPr lang="en-IN" b="0" i="0" dirty="0">
+              <a:effectLst/>
+              <a:latin typeface="-apple-system"/>
+            </a:endParaRPr>
+          </a:p>
+          <a:p>
+            <a:pPr algn="l"/>
+            <a:r>
+              <a:rPr lang="en-IN" b="0" i="0" dirty="0">
+                <a:effectLst/>
+                <a:latin typeface="-apple-system"/>
+              </a:rPr>
+              <a:t>There is a higher possibility of loan default when</a:t>
+            </a:r>
+          </a:p>
+          <a:p>
+            <a:pPr lvl="1"/>
+            <a:r>
+              <a:rPr lang="en-IN" b="0" i="0" dirty="0">
+                <a:effectLst/>
+                <a:latin typeface="-apple-system"/>
+              </a:rPr>
+              <a:t>the loan is verified, and loan amount is above 16k</a:t>
+            </a:r>
+          </a:p>
+          <a:p>
+            <a:pPr lvl="1"/>
+            <a:r>
+              <a:rPr lang="en-IN" b="0" i="0" dirty="0">
+                <a:effectLst/>
+                <a:latin typeface="-apple-system"/>
+              </a:rPr>
+              <a:t>the loan is for 'home improvement' and the income is in the range of 60k -70k</a:t>
+            </a:r>
+          </a:p>
+          <a:p>
+            <a:pPr lvl="1"/>
+            <a:r>
+              <a:rPr lang="en-IN" b="0" i="0" dirty="0">
+                <a:effectLst/>
+                <a:latin typeface="-apple-system"/>
+              </a:rPr>
+              <a:t>the applicant's home ownership is 'MORTGAGE and income is in the range of 60-70k</a:t>
+            </a:r>
+          </a:p>
+          <a:p>
+            <a:pPr lvl="1"/>
+            <a:r>
+              <a:rPr lang="en-IN" b="0" i="0" dirty="0">
+                <a:effectLst/>
+                <a:latin typeface="-apple-system"/>
+              </a:rPr>
+              <a:t>the applicant's home ownership is 'MORTGAGE and the loan amount is 14-16k</a:t>
+            </a:r>
+          </a:p>
+          <a:p>
+            <a:pPr lvl="1"/>
+            <a:r>
+              <a:rPr lang="en-IN" b="0" i="0" dirty="0">
+                <a:effectLst/>
+                <a:latin typeface="-apple-system"/>
+              </a:rPr>
+              <a:t>the applicant takes loan for small business and the loan amount is greater than 14k</a:t>
+            </a:r>
+          </a:p>
+          <a:p>
+            <a:pPr lvl="1"/>
+            <a:r>
+              <a:rPr lang="en-IN" b="0" i="0" dirty="0">
+                <a:effectLst/>
+                <a:latin typeface="-apple-system"/>
+              </a:rPr>
+              <a:t>the employment length is 10yrs and loan amount is 12k-14k</a:t>
+            </a:r>
+          </a:p>
+          <a:p>
+            <a:endParaRPr lang="en-IN" dirty="0"/>
+          </a:p>
+        </p:txBody>
+      </p:sp>
+    </p:spTree>
+    <p:extLst>
+      <p:ext uri="{BB962C8B-B14F-4D97-AF65-F5344CB8AC3E}">
+        <p14:creationId xmlns:p14="http://schemas.microsoft.com/office/powerpoint/2010/main" val="406521080"/>
       </p:ext>
     </p:extLst>
   </p:cSld>

</xml_diff>